<commit_message>
Pwc - Digital Intelligence - Task 3 - Model answer uploaded and task completed using python
</commit_message>
<xml_diff>
--- a/PWC - Digital Intelligence/Task 3 - Quant Finance Modelling/Task_3_Quant_Finance_Modelling.pptx
+++ b/PWC - Digital Intelligence/Task 3 - Quant Finance Modelling/Task_3_Quant_Finance_Modelling.pptx
@@ -247,7 +247,7 @@
           <a:p>
             <a:fld id="{CB204D52-E620-4299-B699-955170BE60C4}" type="datetimeFigureOut">
               <a:rPr lang="en-US" smtClean="0"/>
-              <a:t>12/12/2023</a:t>
+              <a:t>12/13/2023</a:t>
             </a:fld>
             <a:endParaRPr lang="en-US"/>
           </a:p>
@@ -417,7 +417,7 @@
           <a:p>
             <a:fld id="{CB204D52-E620-4299-B699-955170BE60C4}" type="datetimeFigureOut">
               <a:rPr lang="en-US" smtClean="0"/>
-              <a:t>12/12/2023</a:t>
+              <a:t>12/13/2023</a:t>
             </a:fld>
             <a:endParaRPr lang="en-US"/>
           </a:p>
@@ -597,7 +597,7 @@
           <a:p>
             <a:fld id="{CB204D52-E620-4299-B699-955170BE60C4}" type="datetimeFigureOut">
               <a:rPr lang="en-US" smtClean="0"/>
-              <a:t>12/12/2023</a:t>
+              <a:t>12/13/2023</a:t>
             </a:fld>
             <a:endParaRPr lang="en-US"/>
           </a:p>
@@ -767,7 +767,7 @@
           <a:p>
             <a:fld id="{CB204D52-E620-4299-B699-955170BE60C4}" type="datetimeFigureOut">
               <a:rPr lang="en-US" smtClean="0"/>
-              <a:t>12/12/2023</a:t>
+              <a:t>12/13/2023</a:t>
             </a:fld>
             <a:endParaRPr lang="en-US"/>
           </a:p>
@@ -1011,7 +1011,7 @@
           <a:p>
             <a:fld id="{CB204D52-E620-4299-B699-955170BE60C4}" type="datetimeFigureOut">
               <a:rPr lang="en-US" smtClean="0"/>
-              <a:t>12/12/2023</a:t>
+              <a:t>12/13/2023</a:t>
             </a:fld>
             <a:endParaRPr lang="en-US"/>
           </a:p>
@@ -1243,7 +1243,7 @@
           <a:p>
             <a:fld id="{CB204D52-E620-4299-B699-955170BE60C4}" type="datetimeFigureOut">
               <a:rPr lang="en-US" smtClean="0"/>
-              <a:t>12/12/2023</a:t>
+              <a:t>12/13/2023</a:t>
             </a:fld>
             <a:endParaRPr lang="en-US"/>
           </a:p>
@@ -1610,7 +1610,7 @@
           <a:p>
             <a:fld id="{CB204D52-E620-4299-B699-955170BE60C4}" type="datetimeFigureOut">
               <a:rPr lang="en-US" smtClean="0"/>
-              <a:t>12/12/2023</a:t>
+              <a:t>12/13/2023</a:t>
             </a:fld>
             <a:endParaRPr lang="en-US"/>
           </a:p>
@@ -1728,7 +1728,7 @@
           <a:p>
             <a:fld id="{CB204D52-E620-4299-B699-955170BE60C4}" type="datetimeFigureOut">
               <a:rPr lang="en-US" smtClean="0"/>
-              <a:t>12/12/2023</a:t>
+              <a:t>12/13/2023</a:t>
             </a:fld>
             <a:endParaRPr lang="en-US"/>
           </a:p>
@@ -1823,7 +1823,7 @@
           <a:p>
             <a:fld id="{CB204D52-E620-4299-B699-955170BE60C4}" type="datetimeFigureOut">
               <a:rPr lang="en-US" smtClean="0"/>
-              <a:t>12/12/2023</a:t>
+              <a:t>12/13/2023</a:t>
             </a:fld>
             <a:endParaRPr lang="en-US"/>
           </a:p>
@@ -2100,7 +2100,7 @@
           <a:p>
             <a:fld id="{CB204D52-E620-4299-B699-955170BE60C4}" type="datetimeFigureOut">
               <a:rPr lang="en-US" smtClean="0"/>
-              <a:t>12/12/2023</a:t>
+              <a:t>12/13/2023</a:t>
             </a:fld>
             <a:endParaRPr lang="en-US"/>
           </a:p>
@@ -2357,7 +2357,7 @@
           <a:p>
             <a:fld id="{CB204D52-E620-4299-B699-955170BE60C4}" type="datetimeFigureOut">
               <a:rPr lang="en-US" smtClean="0"/>
-              <a:t>12/12/2023</a:t>
+              <a:t>12/13/2023</a:t>
             </a:fld>
             <a:endParaRPr lang="en-US"/>
           </a:p>
@@ -2570,7 +2570,7 @@
           <a:p>
             <a:fld id="{CB204D52-E620-4299-B699-955170BE60C4}" type="datetimeFigureOut">
               <a:rPr lang="en-US" smtClean="0"/>
-              <a:t>12/12/2023</a:t>
+              <a:t>12/13/2023</a:t>
             </a:fld>
             <a:endParaRPr lang="en-US"/>
           </a:p>
@@ -3778,6 +3778,28 @@
               <a:t>The difference is beyond the acceptable limits.</a:t>
             </a:r>
           </a:p>
+          <a:p>
+            <a:endParaRPr lang="en-US" b="1" i="1" dirty="0"/>
+          </a:p>
+          <a:p>
+            <a:r>
+              <a:rPr lang="en-US" b="1" i="1" dirty="0"/>
+              <a:t>Considering </a:t>
+            </a:r>
+            <a:r>
+              <a:rPr lang="en-US" b="1" i="1"/>
+              <a:t>above observations </a:t>
+            </a:r>
+            <a:r>
+              <a:rPr lang="en-US" b="1" i="1" dirty="0"/>
+              <a:t>we will work on it to see if we can come close to the value that client </a:t>
+            </a:r>
+            <a:r>
+              <a:rPr lang="en-US" b="1" i="1"/>
+              <a:t>is expecting.</a:t>
+            </a:r>
+            <a:endParaRPr lang="en-US" b="1" i="1" dirty="0"/>
+          </a:p>
         </p:txBody>
       </p:sp>
     </p:spTree>

</xml_diff>